<commit_message>
quelques modifs doc utilisateur et audit
</commit_message>
<xml_diff>
--- a/Documentations - étape 4/Doc utilisateur/Documentation utilisateur.pptx
+++ b/Documentations - étape 4/Doc utilisateur/Documentation utilisateur.pptx
@@ -109,6 +109,11 @@
       </a:defRPr>
     </a:lvl9pPr>
   </p:defaultTextStyle>
+  <p:extLst>
+    <p:ext uri="{EFAFB233-063F-42B5-8137-9DF3F51BA10A}">
+      <p15:sldGuideLst xmlns:p15="http://schemas.microsoft.com/office/powerpoint/2012/main"/>
+    </p:ext>
+  </p:extLst>
 </p:presentation>
 </file>
 
@@ -275,7 +280,7 @@
           <a:p>
             <a:fld id="{AC091935-04EE-49AF-ABE1-800A98699219}" type="datetimeFigureOut">
               <a:rPr lang="en-US" smtClean="0"/>
-              <a:t>6/26/2019</a:t>
+              <a:t>6/28/2019</a:t>
             </a:fld>
             <a:endParaRPr lang="en-US"/>
           </a:p>
@@ -445,7 +450,7 @@
           <a:p>
             <a:fld id="{AC091935-04EE-49AF-ABE1-800A98699219}" type="datetimeFigureOut">
               <a:rPr lang="en-US" smtClean="0"/>
-              <a:t>6/26/2019</a:t>
+              <a:t>6/28/2019</a:t>
             </a:fld>
             <a:endParaRPr lang="en-US"/>
           </a:p>
@@ -625,7 +630,7 @@
           <a:p>
             <a:fld id="{AC091935-04EE-49AF-ABE1-800A98699219}" type="datetimeFigureOut">
               <a:rPr lang="en-US" smtClean="0"/>
-              <a:t>6/26/2019</a:t>
+              <a:t>6/28/2019</a:t>
             </a:fld>
             <a:endParaRPr lang="en-US"/>
           </a:p>
@@ -795,7 +800,7 @@
           <a:p>
             <a:fld id="{AC091935-04EE-49AF-ABE1-800A98699219}" type="datetimeFigureOut">
               <a:rPr lang="en-US" smtClean="0"/>
-              <a:t>6/26/2019</a:t>
+              <a:t>6/28/2019</a:t>
             </a:fld>
             <a:endParaRPr lang="en-US"/>
           </a:p>
@@ -1063,7 +1068,7 @@
           <a:p>
             <a:fld id="{AC091935-04EE-49AF-ABE1-800A98699219}" type="datetimeFigureOut">
               <a:rPr lang="en-US" smtClean="0"/>
-              <a:t>6/26/2019</a:t>
+              <a:t>6/28/2019</a:t>
             </a:fld>
             <a:endParaRPr lang="en-US"/>
           </a:p>
@@ -1295,7 +1300,7 @@
           <a:p>
             <a:fld id="{AC091935-04EE-49AF-ABE1-800A98699219}" type="datetimeFigureOut">
               <a:rPr lang="en-US" smtClean="0"/>
-              <a:t>6/26/2019</a:t>
+              <a:t>6/28/2019</a:t>
             </a:fld>
             <a:endParaRPr lang="en-US"/>
           </a:p>
@@ -1654,7 +1659,7 @@
           <a:p>
             <a:fld id="{AC091935-04EE-49AF-ABE1-800A98699219}" type="datetimeFigureOut">
               <a:rPr lang="en-US" smtClean="0"/>
-              <a:t>6/26/2019</a:t>
+              <a:t>6/28/2019</a:t>
             </a:fld>
             <a:endParaRPr lang="en-US"/>
           </a:p>
@@ -1795,7 +1800,7 @@
           <a:p>
             <a:fld id="{AC091935-04EE-49AF-ABE1-800A98699219}" type="datetimeFigureOut">
               <a:rPr lang="en-US" smtClean="0"/>
-              <a:t>6/26/2019</a:t>
+              <a:t>6/28/2019</a:t>
             </a:fld>
             <a:endParaRPr lang="en-US"/>
           </a:p>
@@ -1890,7 +1895,7 @@
           <a:p>
             <a:fld id="{AC091935-04EE-49AF-ABE1-800A98699219}" type="datetimeFigureOut">
               <a:rPr lang="en-US" smtClean="0"/>
-              <a:t>6/26/2019</a:t>
+              <a:t>6/28/2019</a:t>
             </a:fld>
             <a:endParaRPr lang="en-US"/>
           </a:p>
@@ -2247,7 +2252,7 @@
           <a:p>
             <a:fld id="{AC091935-04EE-49AF-ABE1-800A98699219}" type="datetimeFigureOut">
               <a:rPr lang="en-US" smtClean="0"/>
-              <a:t>6/26/2019</a:t>
+              <a:t>6/28/2019</a:t>
             </a:fld>
             <a:endParaRPr lang="en-US"/>
           </a:p>
@@ -2604,7 +2609,7 @@
           <a:p>
             <a:fld id="{AC091935-04EE-49AF-ABE1-800A98699219}" type="datetimeFigureOut">
               <a:rPr lang="en-US" smtClean="0"/>
-              <a:t>6/26/2019</a:t>
+              <a:t>6/28/2019</a:t>
             </a:fld>
             <a:endParaRPr lang="en-US"/>
           </a:p>
@@ -2845,7 +2850,7 @@
           <a:p>
             <a:fld id="{AC091935-04EE-49AF-ABE1-800A98699219}" type="datetimeFigureOut">
               <a:rPr lang="en-US" smtClean="0"/>
-              <a:t>6/26/2019</a:t>
+              <a:t>6/28/2019</a:t>
             </a:fld>
             <a:endParaRPr lang="en-US"/>
           </a:p>
@@ -5041,7 +5046,7 @@
         <p:spPr>
           <a:xfrm>
             <a:off x="273292" y="6030519"/>
-            <a:ext cx="10277476" cy="369332"/>
+            <a:ext cx="11481706" cy="646331"/>
           </a:xfrm>
           <a:prstGeom prst="rect">
             <a:avLst/>
@@ -5060,8 +5065,57 @@
                 <a:latin typeface="Arial" panose="020B0604020202020204" pitchFamily="34" charset="0"/>
                 <a:cs typeface="Arial" panose="020B0604020202020204" pitchFamily="34" charset="0"/>
               </a:rPr>
-              <a:t>Une tâche non cochée comme complétée peut aussi être supprimée</a:t>
-            </a:r>
+              <a:t>Une tâche non cochée comme complétée peut aussi être </a:t>
+            </a:r>
+            <a:r>
+              <a:rPr lang="fr-FR" dirty="0" smtClean="0">
+                <a:latin typeface="Arial" panose="020B0604020202020204" pitchFamily="34" charset="0"/>
+                <a:cs typeface="Arial" panose="020B0604020202020204" pitchFamily="34" charset="0"/>
+              </a:rPr>
+              <a:t>supprimée</a:t>
+            </a:r>
+          </a:p>
+          <a:p>
+            <a:pPr algn="just"/>
+            <a:r>
+              <a:rPr lang="fr-FR" dirty="0" smtClean="0">
+                <a:latin typeface="Arial" panose="020B0604020202020204" pitchFamily="34" charset="0"/>
+                <a:cs typeface="Arial" panose="020B0604020202020204" pitchFamily="34" charset="0"/>
+              </a:rPr>
+              <a:t>« </a:t>
+            </a:r>
+            <a:r>
+              <a:rPr lang="fr-FR" dirty="0" err="1" smtClean="0">
+                <a:latin typeface="Arial" panose="020B0604020202020204" pitchFamily="34" charset="0"/>
+                <a:cs typeface="Arial" panose="020B0604020202020204" pitchFamily="34" charset="0"/>
+              </a:rPr>
+              <a:t>Clear</a:t>
+            </a:r>
+            <a:r>
+              <a:rPr lang="fr-FR" dirty="0" smtClean="0">
+                <a:latin typeface="Arial" panose="020B0604020202020204" pitchFamily="34" charset="0"/>
+                <a:cs typeface="Arial" panose="020B0604020202020204" pitchFamily="34" charset="0"/>
+              </a:rPr>
+              <a:t> </a:t>
+            </a:r>
+            <a:r>
+              <a:rPr lang="fr-FR" dirty="0" err="1" smtClean="0">
+                <a:latin typeface="Arial" panose="020B0604020202020204" pitchFamily="34" charset="0"/>
+                <a:cs typeface="Arial" panose="020B0604020202020204" pitchFamily="34" charset="0"/>
+              </a:rPr>
+              <a:t>Completed</a:t>
+            </a:r>
+            <a:r>
+              <a:rPr lang="fr-FR" dirty="0" smtClean="0">
+                <a:latin typeface="Arial" panose="020B0604020202020204" pitchFamily="34" charset="0"/>
+                <a:cs typeface="Arial" panose="020B0604020202020204" pitchFamily="34" charset="0"/>
+              </a:rPr>
+              <a:t> » en bas à droite permet de supprimer toutes les tâches marquées comme complétées</a:t>
+            </a:r>
+            <a:endParaRPr lang="fr-FR" dirty="0" smtClean="0">
+              <a:latin typeface="Arial" panose="020B0604020202020204" pitchFamily="34" charset="0"/>
+              <a:cs typeface="Arial" panose="020B0604020202020204" pitchFamily="34" charset="0"/>
+            </a:endParaRPr>
           </a:p>
         </p:txBody>
       </p:sp>

</xml_diff>